<commit_message>
added DAA, CD and CN resources
</commit_message>
<xml_diff>
--- a/03. Computer Networks/PPTs/3.1. Routing – Shortest Path, Flooding, Distance Vector.pptx
+++ b/03. Computer Networks/PPTs/3.1. Routing – Shortest Path, Flooding, Distance Vector.pptx
@@ -237,7 +237,7 @@
           <a:p>
             <a:fld id="{B539C480-7B49-4288-9FB1-D7859A0D6D3E}" type="datetimeFigureOut">
               <a:rPr lang="en-US" smtClean="0"/>
-              <a:t>4/12/2020</a:t>
+              <a:t>4/19/2020</a:t>
             </a:fld>
             <a:endParaRPr lang="en-US"/>
           </a:p>
@@ -1062,7 +1062,7 @@
             <a:fld id="{1D8BD707-D9CF-40AE-B4C6-C98DA3205C09}" type="datetimeFigureOut">
               <a:rPr lang="en-US" smtClean="0"/>
               <a:pPr/>
-              <a:t>4/12/2020</a:t>
+              <a:t>4/19/2020</a:t>
             </a:fld>
             <a:endParaRPr lang="en-US"/>
           </a:p>
@@ -1227,7 +1227,7 @@
             <a:fld id="{1D8BD707-D9CF-40AE-B4C6-C98DA3205C09}" type="datetimeFigureOut">
               <a:rPr lang="en-US" smtClean="0"/>
               <a:pPr/>
-              <a:t>4/12/2020</a:t>
+              <a:t>4/19/2020</a:t>
             </a:fld>
             <a:endParaRPr lang="en-US"/>
           </a:p>
@@ -1402,7 +1402,7 @@
             <a:fld id="{1D8BD707-D9CF-40AE-B4C6-C98DA3205C09}" type="datetimeFigureOut">
               <a:rPr lang="en-US" smtClean="0"/>
               <a:pPr/>
-              <a:t>4/12/2020</a:t>
+              <a:t>4/19/2020</a:t>
             </a:fld>
             <a:endParaRPr lang="en-US"/>
           </a:p>
@@ -1598,7 +1598,7 @@
             <a:fld id="{1D8BD707-D9CF-40AE-B4C6-C98DA3205C09}" type="datetimeFigureOut">
               <a:rPr lang="en-US" smtClean="0"/>
               <a:pPr/>
-              <a:t>4/12/2020</a:t>
+              <a:t>4/19/2020</a:t>
             </a:fld>
             <a:endParaRPr lang="en-US"/>
           </a:p>
@@ -1840,7 +1840,7 @@
             <a:fld id="{1D8BD707-D9CF-40AE-B4C6-C98DA3205C09}" type="datetimeFigureOut">
               <a:rPr lang="en-US" smtClean="0"/>
               <a:pPr/>
-              <a:t>4/12/2020</a:t>
+              <a:t>4/19/2020</a:t>
             </a:fld>
             <a:endParaRPr lang="en-US"/>
           </a:p>
@@ -2122,7 +2122,7 @@
             <a:fld id="{1D8BD707-D9CF-40AE-B4C6-C98DA3205C09}" type="datetimeFigureOut">
               <a:rPr lang="en-US" smtClean="0"/>
               <a:pPr/>
-              <a:t>4/12/2020</a:t>
+              <a:t>4/19/2020</a:t>
             </a:fld>
             <a:endParaRPr lang="en-US"/>
           </a:p>
@@ -2538,7 +2538,7 @@
             <a:fld id="{1D8BD707-D9CF-40AE-B4C6-C98DA3205C09}" type="datetimeFigureOut">
               <a:rPr lang="en-US" smtClean="0"/>
               <a:pPr/>
-              <a:t>4/12/2020</a:t>
+              <a:t>4/19/2020</a:t>
             </a:fld>
             <a:endParaRPr lang="en-US"/>
           </a:p>
@@ -2652,7 +2652,7 @@
             <a:fld id="{1D8BD707-D9CF-40AE-B4C6-C98DA3205C09}" type="datetimeFigureOut">
               <a:rPr lang="en-US" smtClean="0"/>
               <a:pPr/>
-              <a:t>4/12/2020</a:t>
+              <a:t>4/19/2020</a:t>
             </a:fld>
             <a:endParaRPr lang="en-US"/>
           </a:p>
@@ -2744,7 +2744,7 @@
             <a:fld id="{1D8BD707-D9CF-40AE-B4C6-C98DA3205C09}" type="datetimeFigureOut">
               <a:rPr lang="en-US" smtClean="0"/>
               <a:pPr/>
-              <a:t>4/12/2020</a:t>
+              <a:t>4/19/2020</a:t>
             </a:fld>
             <a:endParaRPr lang="en-US"/>
           </a:p>
@@ -3016,7 +3016,7 @@
             <a:fld id="{1D8BD707-D9CF-40AE-B4C6-C98DA3205C09}" type="datetimeFigureOut">
               <a:rPr lang="en-US" smtClean="0"/>
               <a:pPr/>
-              <a:t>4/12/2020</a:t>
+              <a:t>4/19/2020</a:t>
             </a:fld>
             <a:endParaRPr lang="en-US"/>
           </a:p>
@@ -3265,7 +3265,7 @@
             <a:fld id="{1D8BD707-D9CF-40AE-B4C6-C98DA3205C09}" type="datetimeFigureOut">
               <a:rPr lang="en-US" smtClean="0"/>
               <a:pPr/>
-              <a:t>4/12/2020</a:t>
+              <a:t>4/19/2020</a:t>
             </a:fld>
             <a:endParaRPr lang="en-US"/>
           </a:p>
@@ -3473,7 +3473,7 @@
             <a:fld id="{1D8BD707-D9CF-40AE-B4C6-C98DA3205C09}" type="datetimeFigureOut">
               <a:rPr lang="en-US" smtClean="0"/>
               <a:pPr/>
-              <a:t>4/12/2020</a:t>
+              <a:t>4/19/2020</a:t>
             </a:fld>
             <a:endParaRPr lang="en-US"/>
           </a:p>
@@ -6522,7 +6522,7 @@
         <p:spPr>
           <a:xfrm>
             <a:off x="0" y="1417638"/>
-            <a:ext cx="8915400" cy="5440362"/>
+            <a:ext cx="8915400" cy="5059362"/>
           </a:xfrm>
         </p:spPr>
         <p:txBody>
@@ -6766,7 +6766,17 @@
             <a:pPr algn="just"/>
             <a:r>
               <a:rPr lang="en-US" dirty="0"/>
-              <a:t>Several algorithms for computing the shortest path between two nodes of a graph are known. One is Dijkstra.</a:t>
+              <a:t>Several algorithms for computing the shortest path between two nodes of a graph are known. One is </a:t>
+            </a:r>
+            <a:r>
+              <a:rPr lang="en-US" i="1" dirty="0">
+                <a:latin typeface="Garamond" panose="02020404030301010803" pitchFamily="18" charset="0"/>
+              </a:rPr>
+              <a:t>Dijkstra</a:t>
+            </a:r>
+            <a:r>
+              <a:rPr lang="en-US" dirty="0"/>
+              <a:t>.</a:t>
             </a:r>
           </a:p>
           <a:p>

</xml_diff>